<commit_message>
keeping all happair for dp barely improve error
</commit_message>
<xml_diff>
--- a/notes/imputation_pipeline.pptx
+++ b/notes/imputation_pipeline.pptx
@@ -288,7 +288,7 @@
           <a:p>
             <a:fld id="{A9547C09-EC63-4C4C-ABE8-FCDC473E3B11}" type="datetimeFigureOut">
               <a:rPr lang="en-US" smtClean="0"/>
-              <a:t>20/4/21</a:t>
+              <a:t>20/4/24</a:t>
             </a:fld>
             <a:endParaRPr lang="en-US"/>
           </a:p>
@@ -458,7 +458,7 @@
           <a:p>
             <a:fld id="{A9547C09-EC63-4C4C-ABE8-FCDC473E3B11}" type="datetimeFigureOut">
               <a:rPr lang="en-US" smtClean="0"/>
-              <a:t>20/4/21</a:t>
+              <a:t>20/4/24</a:t>
             </a:fld>
             <a:endParaRPr lang="en-US"/>
           </a:p>
@@ -638,7 +638,7 @@
           <a:p>
             <a:fld id="{A9547C09-EC63-4C4C-ABE8-FCDC473E3B11}" type="datetimeFigureOut">
               <a:rPr lang="en-US" smtClean="0"/>
-              <a:t>20/4/21</a:t>
+              <a:t>20/4/24</a:t>
             </a:fld>
             <a:endParaRPr lang="en-US"/>
           </a:p>
@@ -808,7 +808,7 @@
           <a:p>
             <a:fld id="{A9547C09-EC63-4C4C-ABE8-FCDC473E3B11}" type="datetimeFigureOut">
               <a:rPr lang="en-US" smtClean="0"/>
-              <a:t>20/4/21</a:t>
+              <a:t>20/4/24</a:t>
             </a:fld>
             <a:endParaRPr lang="en-US"/>
           </a:p>
@@ -1054,7 +1054,7 @@
           <a:p>
             <a:fld id="{A9547C09-EC63-4C4C-ABE8-FCDC473E3B11}" type="datetimeFigureOut">
               <a:rPr lang="en-US" smtClean="0"/>
-              <a:t>20/4/21</a:t>
+              <a:t>20/4/24</a:t>
             </a:fld>
             <a:endParaRPr lang="en-US"/>
           </a:p>
@@ -1342,7 +1342,7 @@
           <a:p>
             <a:fld id="{A9547C09-EC63-4C4C-ABE8-FCDC473E3B11}" type="datetimeFigureOut">
               <a:rPr lang="en-US" smtClean="0"/>
-              <a:t>20/4/21</a:t>
+              <a:t>20/4/24</a:t>
             </a:fld>
             <a:endParaRPr lang="en-US"/>
           </a:p>
@@ -1764,7 +1764,7 @@
           <a:p>
             <a:fld id="{A9547C09-EC63-4C4C-ABE8-FCDC473E3B11}" type="datetimeFigureOut">
               <a:rPr lang="en-US" smtClean="0"/>
-              <a:t>20/4/21</a:t>
+              <a:t>20/4/24</a:t>
             </a:fld>
             <a:endParaRPr lang="en-US"/>
           </a:p>
@@ -1882,7 +1882,7 @@
           <a:p>
             <a:fld id="{A9547C09-EC63-4C4C-ABE8-FCDC473E3B11}" type="datetimeFigureOut">
               <a:rPr lang="en-US" smtClean="0"/>
-              <a:t>20/4/21</a:t>
+              <a:t>20/4/24</a:t>
             </a:fld>
             <a:endParaRPr lang="en-US"/>
           </a:p>
@@ -1977,7 +1977,7 @@
           <a:p>
             <a:fld id="{A9547C09-EC63-4C4C-ABE8-FCDC473E3B11}" type="datetimeFigureOut">
               <a:rPr lang="en-US" smtClean="0"/>
-              <a:t>20/4/21</a:t>
+              <a:t>20/4/24</a:t>
             </a:fld>
             <a:endParaRPr lang="en-US"/>
           </a:p>
@@ -2254,7 +2254,7 @@
           <a:p>
             <a:fld id="{A9547C09-EC63-4C4C-ABE8-FCDC473E3B11}" type="datetimeFigureOut">
               <a:rPr lang="en-US" smtClean="0"/>
-              <a:t>20/4/21</a:t>
+              <a:t>20/4/24</a:t>
             </a:fld>
             <a:endParaRPr lang="en-US"/>
           </a:p>
@@ -2507,7 +2507,7 @@
           <a:p>
             <a:fld id="{A9547C09-EC63-4C4C-ABE8-FCDC473E3B11}" type="datetimeFigureOut">
               <a:rPr lang="en-US" smtClean="0"/>
-              <a:t>20/4/21</a:t>
+              <a:t>20/4/24</a:t>
             </a:fld>
             <a:endParaRPr lang="en-US"/>
           </a:p>
@@ -2720,7 +2720,7 @@
           <a:p>
             <a:fld id="{A9547C09-EC63-4C4C-ABE8-FCDC473E3B11}" type="datetimeFigureOut">
               <a:rPr lang="en-US" smtClean="0"/>
-              <a:t>20/4/21</a:t>
+              <a:t>20/4/24</a:t>
             </a:fld>
             <a:endParaRPr lang="en-US"/>
           </a:p>
@@ -3176,17 +3176,8 @@
             </a:pPr>
             <a:r>
               <a:rPr lang="en-US" i="1" dirty="0" smtClean="0"/>
-              <a:t>Phase </a:t>
-            </a:r>
-            <a:r>
-              <a:rPr lang="en-US" i="1" dirty="0" smtClean="0"/>
-              <a:t>data &amp; </a:t>
-            </a:r>
-            <a:r>
-              <a:rPr lang="en-US" i="1" dirty="0" smtClean="0"/>
-              <a:t>impute </a:t>
-            </a:r>
-            <a:endParaRPr lang="en-US" i="1" dirty="0" smtClean="0"/>
+              <a:t>Phase data &amp; impute </a:t>
+            </a:r>
           </a:p>
           <a:p>
             <a:pPr algn="ctr">
@@ -3196,13 +3187,8 @@
             </a:pPr>
             <a:r>
               <a:rPr lang="en-US" i="1" dirty="0" smtClean="0"/>
-              <a:t>randomly </a:t>
-            </a:r>
-            <a:r>
-              <a:rPr lang="en-US" i="1" dirty="0" smtClean="0"/>
-              <a:t>missing </a:t>
-            </a:r>
-            <a:endParaRPr lang="en-US" i="1" dirty="0" smtClean="0"/>
+              <a:t>randomly missing </a:t>
+            </a:r>
           </a:p>
           <a:p>
             <a:pPr algn="ctr">
@@ -3801,23 +3787,7 @@
           <a:p>
             <a:r>
               <a:rPr lang="en-US" i="1" dirty="0" smtClean="0"/>
-              <a:t>(Often required) Convert </a:t>
-            </a:r>
-            <a:r>
-              <a:rPr lang="en-US" i="1" dirty="0" smtClean="0"/>
-              <a:t>VCF files to </a:t>
-            </a:r>
-            <a:r>
-              <a:rPr lang="en-US" i="1" dirty="0" smtClean="0"/>
-              <a:t>specialized </a:t>
-            </a:r>
-            <a:r>
-              <a:rPr lang="en-US" i="1" dirty="0" smtClean="0"/>
-              <a:t>compressed format </a:t>
-            </a:r>
-            <a:r>
-              <a:rPr lang="en-US" i="1" dirty="0" smtClean="0"/>
-              <a:t>using e.g. </a:t>
+              <a:t>(Often required) Convert VCF files to specialized compressed format using e.g. </a:t>
             </a:r>
             <a:r>
               <a:rPr lang="en-US" i="1" dirty="0" err="1" smtClean="0"/>
@@ -3942,11 +3912,7 @@
           <a:p>
             <a:r>
               <a:rPr lang="en-US" dirty="0" smtClean="0"/>
-              <a:t>(VCF</a:t>
-            </a:r>
-            <a:r>
-              <a:rPr lang="en-US" dirty="0" smtClean="0"/>
-              <a:t>, phased)</a:t>
+              <a:t>(VCF, phased)</a:t>
             </a:r>
             <a:endParaRPr lang="en-US" dirty="0"/>
           </a:p>
@@ -4091,7 +4057,6 @@
               <a:rPr lang="en-US" dirty="0" smtClean="0"/>
               <a:t>Reference haplotype</a:t>
             </a:r>
-            <a:endParaRPr lang="en-US" dirty="0" smtClean="0"/>
           </a:p>
           <a:p>
             <a:r>
@@ -4314,15 +4279,7 @@
             </a:r>
             <a:r>
               <a:rPr lang="en-US" i="1" dirty="0" smtClean="0"/>
-              <a:t> 4, </a:t>
-            </a:r>
-            <a:r>
-              <a:rPr lang="en-US" i="1" dirty="0" smtClean="0"/>
-              <a:t>Beagle </a:t>
-            </a:r>
-            <a:r>
-              <a:rPr lang="en-US" i="1" dirty="0" smtClean="0"/>
-              <a:t>5, Impute 5</a:t>
+              <a:t> 4, Beagle 5, Impute 5</a:t>
             </a:r>
             <a:endParaRPr lang="en-US" i="1" dirty="0"/>
           </a:p>
@@ -4479,19 +4436,7 @@
           <a:p>
             <a:r>
               <a:rPr lang="en-US" dirty="0" smtClean="0"/>
-              <a:t>GWAS data </a:t>
-            </a:r>
-            <a:r>
-              <a:rPr lang="en-US" dirty="0" smtClean="0"/>
-              <a:t>(</a:t>
-            </a:r>
-            <a:r>
-              <a:rPr lang="en-US" dirty="0" smtClean="0"/>
-              <a:t>PLINK </a:t>
-            </a:r>
-            <a:r>
-              <a:rPr lang="en-US" dirty="0" smtClean="0"/>
-              <a:t>or VCF files, </a:t>
+              <a:t>GWAS data (PLINK or VCF files, </a:t>
             </a:r>
             <a:r>
               <a:rPr lang="en-US" dirty="0" err="1" smtClean="0"/>
@@ -4612,11 +4557,7 @@
           <a:p>
             <a:r>
               <a:rPr lang="en-US" b="1" dirty="0" smtClean="0"/>
-              <a:t>(PLINK or VCF</a:t>
-            </a:r>
-            <a:r>
-              <a:rPr lang="en-US" b="1" dirty="0" smtClean="0"/>
-              <a:t>, phased)</a:t>
+              <a:t>(PLINK or VCF, phased)</a:t>
             </a:r>
             <a:endParaRPr lang="en-US" b="1" dirty="0"/>
           </a:p>
@@ -4769,7 +4710,6 @@
               <a:rPr lang="en-US" dirty="0" smtClean="0"/>
               <a:t>Reference haplotype</a:t>
             </a:r>
-            <a:endParaRPr lang="en-US" dirty="0" smtClean="0"/>
           </a:p>
           <a:p>
             <a:r>

</xml_diff>